<commit_message>
documenting handling of multiple timepoints
</commit_message>
<xml_diff>
--- a/3DImaging_PipelineSetup_220229.pptx
+++ b/3DImaging_PipelineSetup_220229.pptx
@@ -205,7 +205,7 @@
           <a:p>
             <a:fld id="{2DD6C4EA-F84B-8744-9CDF-3BF539B94832}" type="datetimeFigureOut">
               <a:rPr lang="en-US" smtClean="0"/>
-              <a:t>4/12/22</a:t>
+              <a:t>4/13/22</a:t>
             </a:fld>
             <a:endParaRPr lang="en-US"/>
           </a:p>
@@ -1248,7 +1248,7 @@
           <a:p>
             <a:fld id="{AE54FBC7-1C9C-FD4F-9454-14BDA9D559E8}" type="datetimeFigureOut">
               <a:rPr lang="en-US" smtClean="0"/>
-              <a:t>4/12/22</a:t>
+              <a:t>4/13/22</a:t>
             </a:fld>
             <a:endParaRPr lang="en-US"/>
           </a:p>
@@ -1446,7 +1446,7 @@
           <a:p>
             <a:fld id="{AE54FBC7-1C9C-FD4F-9454-14BDA9D559E8}" type="datetimeFigureOut">
               <a:rPr lang="en-US" smtClean="0"/>
-              <a:t>4/12/22</a:t>
+              <a:t>4/13/22</a:t>
             </a:fld>
             <a:endParaRPr lang="en-US"/>
           </a:p>
@@ -1654,7 +1654,7 @@
           <a:p>
             <a:fld id="{AE54FBC7-1C9C-FD4F-9454-14BDA9D559E8}" type="datetimeFigureOut">
               <a:rPr lang="en-US" smtClean="0"/>
-              <a:t>4/12/22</a:t>
+              <a:t>4/13/22</a:t>
             </a:fld>
             <a:endParaRPr lang="en-US"/>
           </a:p>
@@ -1852,7 +1852,7 @@
           <a:p>
             <a:fld id="{AE54FBC7-1C9C-FD4F-9454-14BDA9D559E8}" type="datetimeFigureOut">
               <a:rPr lang="en-US" smtClean="0"/>
-              <a:t>4/12/22</a:t>
+              <a:t>4/13/22</a:t>
             </a:fld>
             <a:endParaRPr lang="en-US"/>
           </a:p>
@@ -2127,7 +2127,7 @@
           <a:p>
             <a:fld id="{AE54FBC7-1C9C-FD4F-9454-14BDA9D559E8}" type="datetimeFigureOut">
               <a:rPr lang="en-US" smtClean="0"/>
-              <a:t>4/12/22</a:t>
+              <a:t>4/13/22</a:t>
             </a:fld>
             <a:endParaRPr lang="en-US"/>
           </a:p>
@@ -2392,7 +2392,7 @@
           <a:p>
             <a:fld id="{AE54FBC7-1C9C-FD4F-9454-14BDA9D559E8}" type="datetimeFigureOut">
               <a:rPr lang="en-US" smtClean="0"/>
-              <a:t>4/12/22</a:t>
+              <a:t>4/13/22</a:t>
             </a:fld>
             <a:endParaRPr lang="en-US"/>
           </a:p>
@@ -2804,7 +2804,7 @@
           <a:p>
             <a:fld id="{AE54FBC7-1C9C-FD4F-9454-14BDA9D559E8}" type="datetimeFigureOut">
               <a:rPr lang="en-US" smtClean="0"/>
-              <a:t>4/12/22</a:t>
+              <a:t>4/13/22</a:t>
             </a:fld>
             <a:endParaRPr lang="en-US"/>
           </a:p>
@@ -2945,7 +2945,7 @@
           <a:p>
             <a:fld id="{AE54FBC7-1C9C-FD4F-9454-14BDA9D559E8}" type="datetimeFigureOut">
               <a:rPr lang="en-US" smtClean="0"/>
-              <a:t>4/12/22</a:t>
+              <a:t>4/13/22</a:t>
             </a:fld>
             <a:endParaRPr lang="en-US"/>
           </a:p>
@@ -3058,7 +3058,7 @@
           <a:p>
             <a:fld id="{AE54FBC7-1C9C-FD4F-9454-14BDA9D559E8}" type="datetimeFigureOut">
               <a:rPr lang="en-US" smtClean="0"/>
-              <a:t>4/12/22</a:t>
+              <a:t>4/13/22</a:t>
             </a:fld>
             <a:endParaRPr lang="en-US"/>
           </a:p>
@@ -3369,7 +3369,7 @@
           <a:p>
             <a:fld id="{AE54FBC7-1C9C-FD4F-9454-14BDA9D559E8}" type="datetimeFigureOut">
               <a:rPr lang="en-US" smtClean="0"/>
-              <a:t>4/12/22</a:t>
+              <a:t>4/13/22</a:t>
             </a:fld>
             <a:endParaRPr lang="en-US"/>
           </a:p>
@@ -3657,7 +3657,7 @@
           <a:p>
             <a:fld id="{AE54FBC7-1C9C-FD4F-9454-14BDA9D559E8}" type="datetimeFigureOut">
               <a:rPr lang="en-US" smtClean="0"/>
-              <a:t>4/12/22</a:t>
+              <a:t>4/13/22</a:t>
             </a:fld>
             <a:endParaRPr lang="en-US"/>
           </a:p>
@@ -3898,7 +3898,7 @@
           <a:p>
             <a:fld id="{AE54FBC7-1C9C-FD4F-9454-14BDA9D559E8}" type="datetimeFigureOut">
               <a:rPr lang="en-US" smtClean="0"/>
-              <a:t>4/12/22</a:t>
+              <a:t>4/13/22</a:t>
             </a:fld>
             <a:endParaRPr lang="en-US"/>
           </a:p>
@@ -4337,9 +4337,10 @@
           <a:lstStyle/>
           <a:p>
             <a:r>
-              <a:rPr lang="en-US" dirty="0"/>
+              <a:rPr lang="en-US"/>
               <a:t>Color code:</a:t>
             </a:r>
+            <a:endParaRPr lang="en-US" dirty="0"/>
           </a:p>
         </p:txBody>
       </p:sp>
@@ -9917,6 +9918,80 @@
           </a:fontRef>
         </p:style>
       </p:cxnSp>
+      <p:sp>
+        <p:nvSpPr>
+          <p:cNvPr id="15" name="TextBox 14">
+            <a:extLst>
+              <a:ext uri="{FF2B5EF4-FFF2-40B4-BE49-F238E27FC236}">
+                <a16:creationId xmlns:a16="http://schemas.microsoft.com/office/drawing/2014/main" id="{CA4815F7-AFC4-BA4A-84C6-6633580EAECD}"/>
+              </a:ext>
+            </a:extLst>
+          </p:cNvPr>
+          <p:cNvSpPr txBox="1"/>
+          <p:nvPr/>
+        </p:nvSpPr>
+        <p:spPr>
+          <a:xfrm>
+            <a:off x="6310939" y="5403893"/>
+            <a:ext cx="5080878" cy="1200329"/>
+          </a:xfrm>
+          <a:prstGeom prst="rect">
+            <a:avLst/>
+          </a:prstGeom>
+        </p:spPr>
+        <p:style>
+          <a:lnRef idx="2">
+            <a:schemeClr val="dk1"/>
+          </a:lnRef>
+          <a:fillRef idx="1">
+            <a:schemeClr val="lt1"/>
+          </a:fillRef>
+          <a:effectRef idx="0">
+            <a:schemeClr val="dk1"/>
+          </a:effectRef>
+          <a:fontRef idx="minor">
+            <a:schemeClr val="dk1"/>
+          </a:fontRef>
+        </p:style>
+        <p:txBody>
+          <a:bodyPr wrap="square" rtlCol="0">
+            <a:spAutoFit/>
+          </a:bodyPr>
+          <a:lstStyle/>
+          <a:p>
+            <a:r>
+              <a:rPr lang="en-US" b="1" dirty="0"/>
+              <a:t>Solution</a:t>
+            </a:r>
+            <a:r>
+              <a:rPr lang="en-US" dirty="0"/>
+              <a:t>:</a:t>
+            </a:r>
+          </a:p>
+          <a:p>
+            <a:r>
+              <a:rPr lang="en-US" dirty="0"/>
+              <a:t>README file under each folder A01*/</a:t>
+            </a:r>
+            <a:r>
+              <a:rPr lang="en-US" dirty="0" err="1"/>
+              <a:t>FoF</a:t>
+            </a:r>
+            <a:r>
+              <a:rPr lang="en-US" dirty="0"/>
+              <a:t>* specifying any interpretation that comes with the </a:t>
+            </a:r>
+            <a:r>
+              <a:rPr lang="en-US" dirty="0" err="1"/>
+              <a:t>FoF</a:t>
+            </a:r>
+            <a:r>
+              <a:rPr lang="en-US" dirty="0"/>
+              <a:t>#</a:t>
+            </a:r>
+          </a:p>
+        </p:txBody>
+      </p:sp>
     </p:spTree>
     <p:extLst>
       <p:ext uri="{BB962C8B-B14F-4D97-AF65-F5344CB8AC3E}">

</xml_diff>

<commit_message>
h5 generated as input for tracking with Ilastik
</commit_message>
<xml_diff>
--- a/3DImaging_PipelineSetup_220229.pptx
+++ b/3DImaging_PipelineSetup_220229.pptx
@@ -205,7 +205,7 @@
           <a:p>
             <a:fld id="{2DD6C4EA-F84B-8744-9CDF-3BF539B94832}" type="datetimeFigureOut">
               <a:rPr lang="en-US" smtClean="0"/>
-              <a:t>4/13/22</a:t>
+              <a:t>5/10/22</a:t>
             </a:fld>
             <a:endParaRPr lang="en-US"/>
           </a:p>
@@ -1248,7 +1248,7 @@
           <a:p>
             <a:fld id="{AE54FBC7-1C9C-FD4F-9454-14BDA9D559E8}" type="datetimeFigureOut">
               <a:rPr lang="en-US" smtClean="0"/>
-              <a:t>4/13/22</a:t>
+              <a:t>5/10/22</a:t>
             </a:fld>
             <a:endParaRPr lang="en-US"/>
           </a:p>
@@ -1446,7 +1446,7 @@
           <a:p>
             <a:fld id="{AE54FBC7-1C9C-FD4F-9454-14BDA9D559E8}" type="datetimeFigureOut">
               <a:rPr lang="en-US" smtClean="0"/>
-              <a:t>4/13/22</a:t>
+              <a:t>5/10/22</a:t>
             </a:fld>
             <a:endParaRPr lang="en-US"/>
           </a:p>
@@ -1654,7 +1654,7 @@
           <a:p>
             <a:fld id="{AE54FBC7-1C9C-FD4F-9454-14BDA9D559E8}" type="datetimeFigureOut">
               <a:rPr lang="en-US" smtClean="0"/>
-              <a:t>4/13/22</a:t>
+              <a:t>5/10/22</a:t>
             </a:fld>
             <a:endParaRPr lang="en-US"/>
           </a:p>
@@ -1852,7 +1852,7 @@
           <a:p>
             <a:fld id="{AE54FBC7-1C9C-FD4F-9454-14BDA9D559E8}" type="datetimeFigureOut">
               <a:rPr lang="en-US" smtClean="0"/>
-              <a:t>4/13/22</a:t>
+              <a:t>5/10/22</a:t>
             </a:fld>
             <a:endParaRPr lang="en-US"/>
           </a:p>
@@ -2127,7 +2127,7 @@
           <a:p>
             <a:fld id="{AE54FBC7-1C9C-FD4F-9454-14BDA9D559E8}" type="datetimeFigureOut">
               <a:rPr lang="en-US" smtClean="0"/>
-              <a:t>4/13/22</a:t>
+              <a:t>5/10/22</a:t>
             </a:fld>
             <a:endParaRPr lang="en-US"/>
           </a:p>
@@ -2392,7 +2392,7 @@
           <a:p>
             <a:fld id="{AE54FBC7-1C9C-FD4F-9454-14BDA9D559E8}" type="datetimeFigureOut">
               <a:rPr lang="en-US" smtClean="0"/>
-              <a:t>4/13/22</a:t>
+              <a:t>5/10/22</a:t>
             </a:fld>
             <a:endParaRPr lang="en-US"/>
           </a:p>
@@ -2804,7 +2804,7 @@
           <a:p>
             <a:fld id="{AE54FBC7-1C9C-FD4F-9454-14BDA9D559E8}" type="datetimeFigureOut">
               <a:rPr lang="en-US" smtClean="0"/>
-              <a:t>4/13/22</a:t>
+              <a:t>5/10/22</a:t>
             </a:fld>
             <a:endParaRPr lang="en-US"/>
           </a:p>
@@ -2945,7 +2945,7 @@
           <a:p>
             <a:fld id="{AE54FBC7-1C9C-FD4F-9454-14BDA9D559E8}" type="datetimeFigureOut">
               <a:rPr lang="en-US" smtClean="0"/>
-              <a:t>4/13/22</a:t>
+              <a:t>5/10/22</a:t>
             </a:fld>
             <a:endParaRPr lang="en-US"/>
           </a:p>
@@ -3058,7 +3058,7 @@
           <a:p>
             <a:fld id="{AE54FBC7-1C9C-FD4F-9454-14BDA9D559E8}" type="datetimeFigureOut">
               <a:rPr lang="en-US" smtClean="0"/>
-              <a:t>4/13/22</a:t>
+              <a:t>5/10/22</a:t>
             </a:fld>
             <a:endParaRPr lang="en-US"/>
           </a:p>
@@ -3369,7 +3369,7 @@
           <a:p>
             <a:fld id="{AE54FBC7-1C9C-FD4F-9454-14BDA9D559E8}" type="datetimeFigureOut">
               <a:rPr lang="en-US" smtClean="0"/>
-              <a:t>4/13/22</a:t>
+              <a:t>5/10/22</a:t>
             </a:fld>
             <a:endParaRPr lang="en-US"/>
           </a:p>
@@ -3657,7 +3657,7 @@
           <a:p>
             <a:fld id="{AE54FBC7-1C9C-FD4F-9454-14BDA9D559E8}" type="datetimeFigureOut">
               <a:rPr lang="en-US" smtClean="0"/>
-              <a:t>4/13/22</a:t>
+              <a:t>5/10/22</a:t>
             </a:fld>
             <a:endParaRPr lang="en-US"/>
           </a:p>
@@ -3898,7 +3898,7 @@
           <a:p>
             <a:fld id="{AE54FBC7-1C9C-FD4F-9454-14BDA9D559E8}" type="datetimeFigureOut">
               <a:rPr lang="en-US" smtClean="0"/>
-              <a:t>4/13/22</a:t>
+              <a:t>5/10/22</a:t>
             </a:fld>
             <a:endParaRPr lang="en-US"/>
           </a:p>
@@ -8329,7 +8329,7 @@
         <p:spPr>
           <a:xfrm>
             <a:off x="951835" y="6281057"/>
-            <a:ext cx="2693366" cy="369332"/>
+            <a:ext cx="4647106" cy="369332"/>
           </a:xfrm>
           <a:prstGeom prst="rect">
             <a:avLst/>
@@ -8348,7 +8348,7 @@
                   <a:srgbClr val="C00000"/>
                 </a:solidFill>
               </a:rPr>
-              <a:t>Example: FoF1_2022Jan04</a:t>
+              <a:t>Example: FoF1_2022Jan04_fluorescent.nucleus</a:t>
             </a:r>
           </a:p>
         </p:txBody>
@@ -8866,6 +8866,51 @@
               <a:schemeClr val="tx1"/>
             </a:solidFill>
             <a:tailEnd type="triangle" w="lg" len="lg"/>
+          </a:ln>
+        </p:spPr>
+        <p:style>
+          <a:lnRef idx="1">
+            <a:schemeClr val="accent1"/>
+          </a:lnRef>
+          <a:fillRef idx="0">
+            <a:schemeClr val="accent1"/>
+          </a:fillRef>
+          <a:effectRef idx="0">
+            <a:schemeClr val="accent1"/>
+          </a:effectRef>
+          <a:fontRef idx="minor">
+            <a:schemeClr val="tx1"/>
+          </a:fontRef>
+        </p:style>
+      </p:cxnSp>
+      <p:cxnSp>
+        <p:nvCxnSpPr>
+          <p:cNvPr id="33" name="Straight Connector 32">
+            <a:extLst>
+              <a:ext uri="{FF2B5EF4-FFF2-40B4-BE49-F238E27FC236}">
+                <a16:creationId xmlns:a16="http://schemas.microsoft.com/office/drawing/2014/main" id="{EC41500C-F5E3-0848-90B3-F63082DCF93D}"/>
+              </a:ext>
+            </a:extLst>
+          </p:cNvPr>
+          <p:cNvCxnSpPr>
+            <a:cxnSpLocks/>
+            <a:endCxn id="20" idx="3"/>
+          </p:cNvCxnSpPr>
+          <p:nvPr/>
+        </p:nvCxnSpPr>
+        <p:spPr>
+          <a:xfrm flipH="1">
+            <a:off x="8631856" y="2476569"/>
+            <a:ext cx="969346" cy="1379105"/>
+          </a:xfrm>
+          <a:prstGeom prst="line">
+            <a:avLst/>
+          </a:prstGeom>
+          <a:ln w="19050">
+            <a:solidFill>
+              <a:srgbClr val="C00000"/>
+            </a:solidFill>
+            <a:prstDash val="dash"/>
           </a:ln>
         </p:spPr>
         <p:style>

</xml_diff>